<commit_message>
Update new ppts and ppts scale
</commit_message>
<xml_diff>
--- a/(青年聖歌I171)信靠耶穌真是甜美.pptx
+++ b/(青年聖歌I171)信靠耶穌真是甜美.pptx
@@ -5,14 +5,12 @@
     <p:sldMasterId id="2147483660" r:id="rId1"/>
   </p:sldMasterIdLst>
   <p:sldIdLst>
-    <p:sldId id="257" r:id="rId2"/>
-    <p:sldId id="258" r:id="rId3"/>
-    <p:sldId id="259" r:id="rId4"/>
-    <p:sldId id="260" r:id="rId5"/>
-    <p:sldId id="261" r:id="rId6"/>
-    <p:sldId id="262" r:id="rId7"/>
-    <p:sldId id="263" r:id="rId8"/>
-    <p:sldId id="264" r:id="rId9"/>
+    <p:sldId id="256" r:id="rId2"/>
+    <p:sldId id="257" r:id="rId3"/>
+    <p:sldId id="258" r:id="rId4"/>
+    <p:sldId id="259" r:id="rId5"/>
+    <p:sldId id="260" r:id="rId6"/>
+    <p:sldId id="261" r:id="rId7"/>
   </p:sldIdLst>
   <p:sldSz cx="9144000" cy="5143500" type="screen16x9"/>
   <p:notesSz cx="6858000" cy="9144000"/>
@@ -3053,7 +3051,7 @@
       </p:grpSpPr>
       <p:sp>
         <p:nvSpPr>
-          <p:cNvPr id="2" name="Title 1"/>
+          <p:cNvPr id="4" name="標題 3"/>
           <p:cNvSpPr>
             <a:spLocks noGrp="1"/>
           </p:cNvSpPr>
@@ -3075,16 +3073,12 @@
               </a:rPr>
               <a:t>信靠耶穌真是甜美</a:t>
             </a:r>
-            <a:endParaRPr lang="en-US" sz="4000" b="1" dirty="0">
-              <a:latin typeface="Microsoft JhengHei" pitchFamily="34" charset="-120"/>
-              <a:ea typeface="Microsoft JhengHei" pitchFamily="34" charset="-120"/>
-            </a:endParaRPr>
-          </a:p>
-        </p:txBody>
-      </p:sp>
-      <p:sp>
-        <p:nvSpPr>
-          <p:cNvPr id="3" name="Content Placeholder 2"/>
+          </a:p>
+        </p:txBody>
+      </p:sp>
+      <p:sp>
+        <p:nvSpPr>
+          <p:cNvPr id="5" name="內容版面配置區 4"/>
           <p:cNvSpPr>
             <a:spLocks noGrp="1"/>
           </p:cNvSpPr>
@@ -3092,19 +3086,14 @@
             <p:ph idx="1"/>
           </p:nvPr>
         </p:nvSpPr>
-        <p:spPr>
-          <a:xfrm>
-            <a:off x="0" y="1200150"/>
-            <a:ext cx="9144000" cy="3943349"/>
-          </a:xfrm>
-        </p:spPr>
+        <p:spPr/>
         <p:txBody>
           <a:bodyPr>
-            <a:normAutofit/>
+            <a:noAutofit/>
           </a:bodyPr>
           <a:lstStyle/>
           <a:p>
-            <a:pPr marL="0" indent="0" algn="ctr">
+            <a:pPr lvl="0" algn="ctr">
               <a:buNone/>
             </a:pPr>
             <a:r>
@@ -3112,14 +3101,14 @@
                 <a:latin typeface="Microsoft JhengHei" pitchFamily="34" charset="-120"/>
                 <a:ea typeface="Microsoft JhengHei" pitchFamily="34" charset="-120"/>
               </a:rPr>
-              <a:t>信靠耶穌真是甜</a:t>
+              <a:t>信靠耶穌真是</a:t>
             </a:r>
             <a:r>
               <a:rPr lang="zh-TW" altLang="en-US" sz="4800" b="1" dirty="0" smtClean="0">
                 <a:latin typeface="Microsoft JhengHei" pitchFamily="34" charset="-120"/>
                 <a:ea typeface="Microsoft JhengHei" pitchFamily="34" charset="-120"/>
               </a:rPr>
-              <a:t>美</a:t>
+              <a:t>甜美</a:t>
             </a:r>
             <a:endParaRPr lang="en-US" altLang="zh-TW" sz="4800" b="1" dirty="0" smtClean="0">
               <a:latin typeface="Microsoft JhengHei" pitchFamily="34" charset="-120"/>
@@ -3127,7 +3116,7 @@
             </a:endParaRPr>
           </a:p>
           <a:p>
-            <a:pPr marL="0" indent="0" algn="ctr">
+            <a:pPr lvl="0" algn="ctr">
               <a:buNone/>
             </a:pPr>
             <a:r>
@@ -3135,7 +3124,44 @@
                 <a:latin typeface="Microsoft JhengHei" pitchFamily="34" charset="-120"/>
                 <a:ea typeface="Microsoft JhengHei" pitchFamily="34" charset="-120"/>
               </a:rPr>
-              <a:t>只要信靠主恩言</a:t>
+              <a:t>只要</a:t>
+            </a:r>
+            <a:r>
+              <a:rPr lang="zh-TW" altLang="en-US" sz="4800" b="1" dirty="0">
+                <a:latin typeface="Microsoft JhengHei" pitchFamily="34" charset="-120"/>
+                <a:ea typeface="Microsoft JhengHei" pitchFamily="34" charset="-120"/>
+              </a:rPr>
+              <a:t>信靠主恩</a:t>
+            </a:r>
+            <a:r>
+              <a:rPr lang="zh-TW" altLang="en-US" sz="4800" b="1" dirty="0" smtClean="0">
+                <a:latin typeface="Microsoft JhengHei" pitchFamily="34" charset="-120"/>
+                <a:ea typeface="Microsoft JhengHei" pitchFamily="34" charset="-120"/>
+              </a:rPr>
+              <a:t>言</a:t>
+            </a:r>
+            <a:endParaRPr lang="zh-TW" altLang="en-US" sz="4800" b="1" dirty="0">
+              <a:latin typeface="Microsoft JhengHei" pitchFamily="34" charset="-120"/>
+              <a:ea typeface="Microsoft JhengHei" pitchFamily="34" charset="-120"/>
+            </a:endParaRPr>
+          </a:p>
+          <a:p>
+            <a:pPr algn="ctr">
+              <a:buNone/>
+            </a:pPr>
+            <a:r>
+              <a:rPr lang="zh-TW" altLang="en-US" sz="4800" b="1" dirty="0">
+                <a:latin typeface="Microsoft JhengHei" pitchFamily="34" charset="-120"/>
+                <a:ea typeface="Microsoft JhengHei" pitchFamily="34" charset="-120"/>
+              </a:rPr>
+              <a:t>只要站在主應</a:t>
+            </a:r>
+            <a:r>
+              <a:rPr lang="zh-TW" altLang="en-US" sz="4800" b="1" dirty="0" smtClean="0">
+                <a:latin typeface="Microsoft JhengHei" pitchFamily="34" charset="-120"/>
+                <a:ea typeface="Microsoft JhengHei" pitchFamily="34" charset="-120"/>
+              </a:rPr>
+              <a:t>許上</a:t>
             </a:r>
             <a:endParaRPr lang="en-US" altLang="zh-TW" sz="4800" b="1" dirty="0" smtClean="0">
               <a:latin typeface="Microsoft JhengHei" pitchFamily="34" charset="-120"/>
@@ -3143,7 +3169,7 @@
             </a:endParaRPr>
           </a:p>
           <a:p>
-            <a:pPr marL="0" indent="0" algn="ctr">
+            <a:pPr algn="ctr">
               <a:buNone/>
             </a:pPr>
             <a:r>
@@ -3151,69 +3177,28 @@
                 <a:latin typeface="Microsoft JhengHei" pitchFamily="34" charset="-120"/>
                 <a:ea typeface="Microsoft JhengHei" pitchFamily="34" charset="-120"/>
               </a:rPr>
-              <a:t>只</a:t>
+              <a:t>信</a:t>
             </a:r>
             <a:r>
               <a:rPr lang="zh-TW" altLang="en-US" sz="4800" b="1" dirty="0">
                 <a:latin typeface="Microsoft JhengHei" pitchFamily="34" charset="-120"/>
                 <a:ea typeface="Microsoft JhengHei" pitchFamily="34" charset="-120"/>
               </a:rPr>
-              <a:t>要站在主應許</a:t>
-            </a:r>
-            <a:r>
-              <a:rPr lang="zh-TW" altLang="en-US" sz="4800" b="1" dirty="0" smtClean="0">
-                <a:latin typeface="Microsoft JhengHei" pitchFamily="34" charset="-120"/>
-                <a:ea typeface="Microsoft JhengHei" pitchFamily="34" charset="-120"/>
-              </a:rPr>
-              <a:t>上</a:t>
-            </a:r>
-            <a:endParaRPr lang="en-US" altLang="zh-TW" sz="4800" b="1" dirty="0" smtClean="0">
-              <a:latin typeface="Microsoft JhengHei" pitchFamily="34" charset="-120"/>
-              <a:ea typeface="Microsoft JhengHei" pitchFamily="34" charset="-120"/>
-            </a:endParaRPr>
-          </a:p>
-          <a:p>
-            <a:pPr marL="0" indent="0" algn="ctr">
-              <a:buNone/>
-            </a:pPr>
-            <a:r>
-              <a:rPr lang="zh-TW" altLang="en-US" sz="4800" b="1" dirty="0" smtClean="0">
-                <a:latin typeface="Microsoft JhengHei" pitchFamily="34" charset="-120"/>
-                <a:ea typeface="Microsoft JhengHei" pitchFamily="34" charset="-120"/>
-              </a:rPr>
-              <a:t>信</a:t>
-            </a:r>
-            <a:r>
-              <a:rPr lang="zh-TW" altLang="en-US" sz="4800" b="1" dirty="0">
-                <a:latin typeface="Microsoft JhengHei" pitchFamily="34" charset="-120"/>
-                <a:ea typeface="Microsoft JhengHei" pitchFamily="34" charset="-120"/>
-              </a:rPr>
-              <a:t>靠主蒙福無</a:t>
-            </a:r>
-            <a:r>
-              <a:rPr lang="zh-TW" altLang="en-US" sz="4800" b="1" dirty="0" smtClean="0">
-                <a:latin typeface="Microsoft JhengHei" pitchFamily="34" charset="-120"/>
-                <a:ea typeface="Microsoft JhengHei" pitchFamily="34" charset="-120"/>
-              </a:rPr>
-              <a:t>邊</a:t>
-            </a:r>
-            <a:endParaRPr lang="en-US" sz="4800" b="1" dirty="0">
-              <a:latin typeface="Microsoft JhengHei" pitchFamily="34" charset="-120"/>
-              <a:ea typeface="Microsoft JhengHei" pitchFamily="34" charset="-120"/>
-            </a:endParaRPr>
-          </a:p>
-        </p:txBody>
-      </p:sp>
-      <p:sp>
-        <p:nvSpPr>
-          <p:cNvPr id="4" name="TextBox 3"/>
+              <a:t>靠主蒙福無邊</a:t>
+            </a:r>
+          </a:p>
+        </p:txBody>
+      </p:sp>
+      <p:sp>
+        <p:nvSpPr>
+          <p:cNvPr id="2" name="TextBox 1"/>
           <p:cNvSpPr txBox="1"/>
           <p:nvPr/>
         </p:nvSpPr>
         <p:spPr>
           <a:xfrm>
-            <a:off x="1371600" y="1276350"/>
-            <a:ext cx="762000" cy="707886"/>
+            <a:off x="1219200" y="1276350"/>
+            <a:ext cx="914400" cy="769441"/>
           </a:xfrm>
           <a:prstGeom prst="rect">
             <a:avLst/>
@@ -3227,13 +3212,13 @@
           <a:lstStyle/>
           <a:p>
             <a:r>
-              <a:rPr lang="en-US" sz="4000" b="1" dirty="0">
+              <a:rPr lang="en-US" sz="4400" b="1" dirty="0">
                 <a:latin typeface="Microsoft JhengHei" pitchFamily="34" charset="-120"/>
                 <a:ea typeface="Microsoft JhengHei" pitchFamily="34" charset="-120"/>
               </a:rPr>
               <a:t>1.</a:t>
             </a:r>
-            <a:endParaRPr lang="en-US" sz="4000" b="1" dirty="0">
+            <a:endParaRPr lang="en-US" sz="4400" b="1" dirty="0">
               <a:latin typeface="Microsoft JhengHei" pitchFamily="34" charset="-120"/>
               <a:ea typeface="Microsoft JhengHei" pitchFamily="34" charset="-120"/>
             </a:endParaRPr>
@@ -3243,7 +3228,7 @@
     </p:spTree>
     <p:extLst>
       <p:ext uri="{BB962C8B-B14F-4D97-AF65-F5344CB8AC3E}">
-        <p14:creationId xmlns:p14="http://schemas.microsoft.com/office/powerpoint/2010/main" val="1897169440"/>
+        <p14:creationId xmlns:p14="http://schemas.microsoft.com/office/powerpoint/2010/main" val="4063246703"/>
       </p:ext>
     </p:extLst>
   </p:cSld>
@@ -3272,7 +3257,7 @@
       </p:grpSpPr>
       <p:sp>
         <p:nvSpPr>
-          <p:cNvPr id="2" name="Title 1"/>
+          <p:cNvPr id="4" name="標題 3"/>
           <p:cNvSpPr>
             <a:spLocks noGrp="1"/>
           </p:cNvSpPr>
@@ -3294,16 +3279,12 @@
               </a:rPr>
               <a:t>信靠耶穌真是甜美</a:t>
             </a:r>
-            <a:endParaRPr lang="en-US" sz="4000" b="1" dirty="0">
-              <a:latin typeface="Microsoft JhengHei" pitchFamily="34" charset="-120"/>
-              <a:ea typeface="Microsoft JhengHei" pitchFamily="34" charset="-120"/>
-            </a:endParaRPr>
-          </a:p>
-        </p:txBody>
-      </p:sp>
-      <p:sp>
-        <p:nvSpPr>
-          <p:cNvPr id="3" name="Content Placeholder 2"/>
+          </a:p>
+        </p:txBody>
+      </p:sp>
+      <p:sp>
+        <p:nvSpPr>
+          <p:cNvPr id="5" name="內容版面配置區 4"/>
           <p:cNvSpPr>
             <a:spLocks noGrp="1"/>
           </p:cNvSpPr>
@@ -3311,19 +3292,14 @@
             <p:ph idx="1"/>
           </p:nvPr>
         </p:nvSpPr>
-        <p:spPr>
-          <a:xfrm>
-            <a:off x="0" y="1200150"/>
-            <a:ext cx="9144000" cy="3943349"/>
-          </a:xfrm>
-        </p:spPr>
+        <p:spPr/>
         <p:txBody>
           <a:bodyPr>
-            <a:normAutofit/>
+            <a:noAutofit/>
           </a:bodyPr>
           <a:lstStyle/>
           <a:p>
-            <a:pPr marL="0" indent="0" algn="ctr">
+            <a:pPr lvl="0" algn="ctr">
               <a:buNone/>
             </a:pPr>
             <a:r>
@@ -3331,28 +3307,7 @@
                 <a:latin typeface="Microsoft JhengHei" pitchFamily="34" charset="-120"/>
                 <a:ea typeface="Microsoft JhengHei" pitchFamily="34" charset="-120"/>
               </a:rPr>
-              <a:t>耶</a:t>
-            </a:r>
-            <a:r>
-              <a:rPr lang="zh-TW" altLang="en-US" sz="4800" b="1" dirty="0">
-                <a:latin typeface="Microsoft JhengHei" pitchFamily="34" charset="-120"/>
-                <a:ea typeface="Microsoft JhengHei" pitchFamily="34" charset="-120"/>
-              </a:rPr>
-              <a:t>穌  耶穌  何</a:t>
-            </a:r>
-            <a:r>
-              <a:rPr lang="zh-TW" altLang="en-US" sz="4800" b="1" dirty="0">
-                <a:latin typeface="Microsoft JhengHei" pitchFamily="34" charset="-120"/>
-                <a:ea typeface="Microsoft JhengHei" pitchFamily="34" charset="-120"/>
-              </a:rPr>
-              <a:t>等可</a:t>
-            </a:r>
-            <a:r>
-              <a:rPr lang="zh-TW" altLang="en-US" sz="4800" b="1" dirty="0">
-                <a:latin typeface="Microsoft JhengHei" pitchFamily="34" charset="-120"/>
-                <a:ea typeface="Microsoft JhengHei" pitchFamily="34" charset="-120"/>
-              </a:rPr>
-              <a:t>靠</a:t>
+              <a:t>耶穌 耶穌  何等可靠</a:t>
             </a:r>
             <a:endParaRPr lang="en-US" altLang="zh-TW" sz="4800" b="1" dirty="0">
               <a:latin typeface="Microsoft JhengHei" pitchFamily="34" charset="-120"/>
@@ -3360,7 +3315,7 @@
             </a:endParaRPr>
           </a:p>
           <a:p>
-            <a:pPr marL="0" indent="0" algn="ctr">
+            <a:pPr lvl="0" algn="ctr">
               <a:buNone/>
             </a:pPr>
             <a:r>
@@ -3368,21 +3323,21 @@
                 <a:latin typeface="Microsoft JhengHei" pitchFamily="34" charset="-120"/>
                 <a:ea typeface="Microsoft JhengHei" pitchFamily="34" charset="-120"/>
               </a:rPr>
-              <a:t>多</a:t>
+              <a:t>多少</a:t>
             </a:r>
             <a:r>
               <a:rPr lang="zh-TW" altLang="en-US" sz="4800" b="1" dirty="0">
                 <a:latin typeface="Microsoft JhengHei" pitchFamily="34" charset="-120"/>
                 <a:ea typeface="Microsoft JhengHei" pitchFamily="34" charset="-120"/>
               </a:rPr>
-              <a:t>少事上已證</a:t>
+              <a:t>事上已</a:t>
             </a:r>
             <a:r>
               <a:rPr lang="zh-TW" altLang="en-US" sz="4800" b="1" dirty="0">
                 <a:latin typeface="Microsoft JhengHei" pitchFamily="34" charset="-120"/>
                 <a:ea typeface="Microsoft JhengHei" pitchFamily="34" charset="-120"/>
               </a:rPr>
-              <a:t>明</a:t>
+              <a:t>證明</a:t>
             </a:r>
             <a:endParaRPr lang="en-US" altLang="zh-TW" sz="4800" b="1" dirty="0">
               <a:latin typeface="Microsoft JhengHei" pitchFamily="34" charset="-120"/>
@@ -3390,7 +3345,7 @@
             </a:endParaRPr>
           </a:p>
           <a:p>
-            <a:pPr marL="0" indent="0" algn="ctr">
+            <a:pPr lvl="0" algn="ctr">
               <a:buNone/>
             </a:pPr>
             <a:r>
@@ -3398,21 +3353,7 @@
                 <a:latin typeface="Microsoft JhengHei" pitchFamily="34" charset="-120"/>
                 <a:ea typeface="Microsoft JhengHei" pitchFamily="34" charset="-120"/>
               </a:rPr>
-              <a:t>耶穌  耶穌  寶</a:t>
-            </a:r>
-            <a:r>
-              <a:rPr lang="zh-TW" altLang="en-US" sz="4800" b="1" dirty="0">
-                <a:latin typeface="Microsoft JhengHei" pitchFamily="34" charset="-120"/>
-                <a:ea typeface="Microsoft JhengHei" pitchFamily="34" charset="-120"/>
-              </a:rPr>
-              <a:t>貴耶</a:t>
-            </a:r>
-            <a:r>
-              <a:rPr lang="zh-TW" altLang="en-US" sz="4800" b="1" dirty="0">
-                <a:latin typeface="Microsoft JhengHei" pitchFamily="34" charset="-120"/>
-                <a:ea typeface="Microsoft JhengHei" pitchFamily="34" charset="-120"/>
-              </a:rPr>
-              <a:t>穌</a:t>
+              <a:t>耶穌  耶穌  寶貴耶穌</a:t>
             </a:r>
             <a:endParaRPr lang="en-US" altLang="zh-TW" sz="4800" b="1" dirty="0">
               <a:latin typeface="Microsoft JhengHei" pitchFamily="34" charset="-120"/>
@@ -3420,7 +3361,7 @@
             </a:endParaRPr>
           </a:p>
           <a:p>
-            <a:pPr marL="0" indent="0" algn="ctr">
+            <a:pPr lvl="0" algn="ctr">
               <a:buNone/>
             </a:pPr>
             <a:r>
@@ -3437,17 +3378,13 @@
               </a:rPr>
               <a:t>我信心更堅定</a:t>
             </a:r>
-            <a:endParaRPr lang="en-US" sz="4800" b="1" dirty="0">
-              <a:latin typeface="Microsoft JhengHei" pitchFamily="34" charset="-120"/>
-              <a:ea typeface="Microsoft JhengHei" pitchFamily="34" charset="-120"/>
-            </a:endParaRPr>
           </a:p>
         </p:txBody>
       </p:sp>
     </p:spTree>
     <p:extLst>
       <p:ext uri="{BB962C8B-B14F-4D97-AF65-F5344CB8AC3E}">
-        <p14:creationId xmlns:p14="http://schemas.microsoft.com/office/powerpoint/2010/main" val="3495321079"/>
+        <p14:creationId xmlns:p14="http://schemas.microsoft.com/office/powerpoint/2010/main" val="3470707492"/>
       </p:ext>
     </p:extLst>
   </p:cSld>
@@ -3476,7 +3413,7 @@
       </p:grpSpPr>
       <p:sp>
         <p:nvSpPr>
-          <p:cNvPr id="2" name="Title 1"/>
+          <p:cNvPr id="4" name="標題 3"/>
           <p:cNvSpPr>
             <a:spLocks noGrp="1"/>
           </p:cNvSpPr>
@@ -3498,16 +3435,12 @@
               </a:rPr>
               <a:t>信靠耶穌真是甜美</a:t>
             </a:r>
-            <a:endParaRPr lang="en-US" sz="4000" b="1" dirty="0">
-              <a:latin typeface="Microsoft JhengHei" pitchFamily="34" charset="-120"/>
-              <a:ea typeface="Microsoft JhengHei" pitchFamily="34" charset="-120"/>
-            </a:endParaRPr>
-          </a:p>
-        </p:txBody>
-      </p:sp>
-      <p:sp>
-        <p:nvSpPr>
-          <p:cNvPr id="3" name="Content Placeholder 2"/>
+          </a:p>
+        </p:txBody>
+      </p:sp>
+      <p:sp>
+        <p:nvSpPr>
+          <p:cNvPr id="5" name="內容版面配置區 4"/>
           <p:cNvSpPr>
             <a:spLocks noGrp="1"/>
           </p:cNvSpPr>
@@ -3515,19 +3448,14 @@
             <p:ph idx="1"/>
           </p:nvPr>
         </p:nvSpPr>
-        <p:spPr>
-          <a:xfrm>
-            <a:off x="0" y="1200150"/>
-            <a:ext cx="9144000" cy="3943349"/>
-          </a:xfrm>
-        </p:spPr>
+        <p:spPr/>
         <p:txBody>
           <a:bodyPr>
-            <a:normAutofit/>
+            <a:noAutofit/>
           </a:bodyPr>
           <a:lstStyle/>
           <a:p>
-            <a:pPr marL="0" indent="0" algn="ctr">
+            <a:pPr algn="ctr">
               <a:buNone/>
             </a:pPr>
             <a:r>
@@ -3535,14 +3463,14 @@
                 <a:latin typeface="Microsoft JhengHei" pitchFamily="34" charset="-120"/>
                 <a:ea typeface="Microsoft JhengHei" pitchFamily="34" charset="-120"/>
               </a:rPr>
-              <a:t>信靠耶穌何等甜</a:t>
+              <a:t>信靠耶穌何等</a:t>
             </a:r>
             <a:r>
               <a:rPr lang="zh-TW" altLang="en-US" sz="4800" b="1" dirty="0">
                 <a:latin typeface="Microsoft JhengHei" pitchFamily="34" charset="-120"/>
                 <a:ea typeface="Microsoft JhengHei" pitchFamily="34" charset="-120"/>
               </a:rPr>
-              <a:t>美</a:t>
+              <a:t>甜美</a:t>
             </a:r>
             <a:endParaRPr lang="en-US" altLang="zh-TW" sz="4800" b="1" dirty="0">
               <a:latin typeface="Microsoft JhengHei" pitchFamily="34" charset="-120"/>
@@ -3550,7 +3478,7 @@
             </a:endParaRPr>
           </a:p>
           <a:p>
-            <a:pPr marL="0" indent="0" algn="ctr">
+            <a:pPr algn="ctr">
               <a:buNone/>
             </a:pPr>
             <a:r>
@@ -3558,14 +3486,14 @@
                 <a:latin typeface="Microsoft JhengHei" pitchFamily="34" charset="-120"/>
                 <a:ea typeface="Microsoft JhengHei" pitchFamily="34" charset="-120"/>
               </a:rPr>
-              <a:t>只</a:t>
+              <a:t>只要</a:t>
             </a:r>
             <a:r>
               <a:rPr lang="zh-TW" altLang="en-US" sz="4800" b="1" dirty="0">
                 <a:latin typeface="Microsoft JhengHei" pitchFamily="34" charset="-120"/>
                 <a:ea typeface="Microsoft JhengHei" pitchFamily="34" charset="-120"/>
               </a:rPr>
-              <a:t>要信靠主寶</a:t>
+              <a:t>信靠主寶</a:t>
             </a:r>
             <a:r>
               <a:rPr lang="zh-TW" altLang="en-US" sz="4800" b="1" dirty="0">
@@ -3573,6 +3501,29 @@
                 <a:ea typeface="Microsoft JhengHei" pitchFamily="34" charset="-120"/>
               </a:rPr>
               <a:t>血</a:t>
+            </a:r>
+            <a:endParaRPr lang="zh-TW" altLang="en-US" sz="4800" b="1" dirty="0">
+              <a:latin typeface="Microsoft JhengHei" pitchFamily="34" charset="-120"/>
+              <a:ea typeface="Microsoft JhengHei" pitchFamily="34" charset="-120"/>
+            </a:endParaRPr>
+          </a:p>
+          <a:p>
+            <a:pPr algn="ctr">
+              <a:buNone/>
+            </a:pPr>
+            <a:r>
+              <a:rPr lang="zh-TW" altLang="en-US" sz="4800" b="1" dirty="0">
+                <a:latin typeface="Microsoft JhengHei" pitchFamily="34" charset="-120"/>
+                <a:ea typeface="Microsoft JhengHei" pitchFamily="34" charset="-120"/>
+              </a:rPr>
+              <a:t>只要憑著純一</a:t>
+            </a:r>
+            <a:r>
+              <a:rPr lang="zh-TW" altLang="en-US" sz="4800" b="1" dirty="0">
+                <a:latin typeface="Microsoft JhengHei" pitchFamily="34" charset="-120"/>
+                <a:ea typeface="Microsoft JhengHei" pitchFamily="34" charset="-120"/>
+              </a:rPr>
+              <a:t>信心</a:t>
             </a:r>
             <a:endParaRPr lang="en-US" altLang="zh-TW" sz="4800" b="1" dirty="0">
               <a:latin typeface="Microsoft JhengHei" pitchFamily="34" charset="-120"/>
@@ -3580,7 +3531,7 @@
             </a:endParaRPr>
           </a:p>
           <a:p>
-            <a:pPr marL="0" indent="0" algn="ctr">
+            <a:pPr algn="ctr">
               <a:buNone/>
             </a:pPr>
             <a:r>
@@ -3588,69 +3539,28 @@
                 <a:latin typeface="Microsoft JhengHei" pitchFamily="34" charset="-120"/>
                 <a:ea typeface="Microsoft JhengHei" pitchFamily="34" charset="-120"/>
               </a:rPr>
-              <a:t>只</a:t>
+              <a:t>能</a:t>
             </a:r>
             <a:r>
               <a:rPr lang="zh-TW" altLang="en-US" sz="4800" b="1" dirty="0">
                 <a:latin typeface="Microsoft JhengHei" pitchFamily="34" charset="-120"/>
                 <a:ea typeface="Microsoft JhengHei" pitchFamily="34" charset="-120"/>
               </a:rPr>
-              <a:t>要憑著純一信</a:t>
-            </a:r>
-            <a:r>
-              <a:rPr lang="zh-TW" altLang="en-US" sz="4800" b="1" dirty="0">
-                <a:latin typeface="Microsoft JhengHei" pitchFamily="34" charset="-120"/>
-                <a:ea typeface="Microsoft JhengHei" pitchFamily="34" charset="-120"/>
-              </a:rPr>
-              <a:t>心</a:t>
-            </a:r>
-            <a:endParaRPr lang="en-US" altLang="zh-TW" sz="4800" b="1" dirty="0">
-              <a:latin typeface="Microsoft JhengHei" pitchFamily="34" charset="-120"/>
-              <a:ea typeface="Microsoft JhengHei" pitchFamily="34" charset="-120"/>
-            </a:endParaRPr>
-          </a:p>
-          <a:p>
-            <a:pPr marL="0" indent="0" algn="ctr">
-              <a:buNone/>
-            </a:pPr>
-            <a:r>
-              <a:rPr lang="zh-TW" altLang="en-US" sz="4800" b="1" dirty="0">
-                <a:latin typeface="Microsoft JhengHei" pitchFamily="34" charset="-120"/>
-                <a:ea typeface="Microsoft JhengHei" pitchFamily="34" charset="-120"/>
-              </a:rPr>
-              <a:t>能</a:t>
-            </a:r>
-            <a:r>
-              <a:rPr lang="zh-TW" altLang="en-US" sz="4800" b="1" dirty="0">
-                <a:latin typeface="Microsoft JhengHei" pitchFamily="34" charset="-120"/>
-                <a:ea typeface="Microsoft JhengHei" pitchFamily="34" charset="-120"/>
-              </a:rPr>
-              <a:t>洗罪污白如</a:t>
-            </a:r>
-            <a:r>
-              <a:rPr lang="zh-TW" altLang="en-US" sz="4800" b="1" dirty="0">
-                <a:latin typeface="Microsoft JhengHei" pitchFamily="34" charset="-120"/>
-                <a:ea typeface="Microsoft JhengHei" pitchFamily="34" charset="-120"/>
-              </a:rPr>
-              <a:t>雪</a:t>
-            </a:r>
-            <a:endParaRPr lang="en-US" sz="4800" b="1" dirty="0">
-              <a:latin typeface="Microsoft JhengHei" pitchFamily="34" charset="-120"/>
-              <a:ea typeface="Microsoft JhengHei" pitchFamily="34" charset="-120"/>
-            </a:endParaRPr>
-          </a:p>
-        </p:txBody>
-      </p:sp>
-      <p:sp>
-        <p:nvSpPr>
-          <p:cNvPr id="4" name="TextBox 3"/>
+              <a:t>洗罪污白如雪</a:t>
+            </a:r>
+          </a:p>
+        </p:txBody>
+      </p:sp>
+      <p:sp>
+        <p:nvSpPr>
+          <p:cNvPr id="6" name="TextBox 5"/>
           <p:cNvSpPr txBox="1"/>
           <p:nvPr/>
         </p:nvSpPr>
         <p:spPr>
           <a:xfrm>
-            <a:off x="1371600" y="1276350"/>
-            <a:ext cx="762000" cy="707886"/>
+            <a:off x="1219200" y="1276350"/>
+            <a:ext cx="914400" cy="769441"/>
           </a:xfrm>
           <a:prstGeom prst="rect">
             <a:avLst/>
@@ -3664,13 +3574,13 @@
           <a:lstStyle/>
           <a:p>
             <a:r>
-              <a:rPr lang="en-US" sz="4000" b="1" dirty="0" smtClean="0">
+              <a:rPr lang="en-US" sz="4400" b="1" dirty="0" smtClean="0">
                 <a:latin typeface="Microsoft JhengHei" pitchFamily="34" charset="-120"/>
                 <a:ea typeface="Microsoft JhengHei" pitchFamily="34" charset="-120"/>
               </a:rPr>
               <a:t>2.</a:t>
             </a:r>
-            <a:endParaRPr lang="en-US" sz="4000" b="1" dirty="0">
+            <a:endParaRPr lang="en-US" sz="4400" b="1" dirty="0">
               <a:latin typeface="Microsoft JhengHei" pitchFamily="34" charset="-120"/>
               <a:ea typeface="Microsoft JhengHei" pitchFamily="34" charset="-120"/>
             </a:endParaRPr>
@@ -3680,7 +3590,7 @@
     </p:spTree>
     <p:extLst>
       <p:ext uri="{BB962C8B-B14F-4D97-AF65-F5344CB8AC3E}">
-        <p14:creationId xmlns:p14="http://schemas.microsoft.com/office/powerpoint/2010/main" val="4065609707"/>
+        <p14:creationId xmlns:p14="http://schemas.microsoft.com/office/powerpoint/2010/main" val="2479405893"/>
       </p:ext>
     </p:extLst>
   </p:cSld>
@@ -3709,7 +3619,7 @@
       </p:grpSpPr>
       <p:sp>
         <p:nvSpPr>
-          <p:cNvPr id="2" name="Title 1"/>
+          <p:cNvPr id="4" name="標題 3"/>
           <p:cNvSpPr>
             <a:spLocks noGrp="1"/>
           </p:cNvSpPr>
@@ -3731,16 +3641,12 @@
               </a:rPr>
               <a:t>信靠耶穌真是甜美</a:t>
             </a:r>
-            <a:endParaRPr lang="en-US" sz="4000" b="1" dirty="0">
-              <a:latin typeface="Microsoft JhengHei" pitchFamily="34" charset="-120"/>
-              <a:ea typeface="Microsoft JhengHei" pitchFamily="34" charset="-120"/>
-            </a:endParaRPr>
-          </a:p>
-        </p:txBody>
-      </p:sp>
-      <p:sp>
-        <p:nvSpPr>
-          <p:cNvPr id="3" name="Content Placeholder 2"/>
+          </a:p>
+        </p:txBody>
+      </p:sp>
+      <p:sp>
+        <p:nvSpPr>
+          <p:cNvPr id="5" name="內容版面配置區 4"/>
           <p:cNvSpPr>
             <a:spLocks noGrp="1"/>
           </p:cNvSpPr>
@@ -3748,19 +3654,14 @@
             <p:ph idx="1"/>
           </p:nvPr>
         </p:nvSpPr>
-        <p:spPr>
-          <a:xfrm>
-            <a:off x="0" y="1200150"/>
-            <a:ext cx="9144000" cy="3943349"/>
-          </a:xfrm>
-        </p:spPr>
+        <p:spPr/>
         <p:txBody>
           <a:bodyPr>
-            <a:normAutofit/>
+            <a:noAutofit/>
           </a:bodyPr>
           <a:lstStyle/>
           <a:p>
-            <a:pPr marL="0" indent="0" algn="ctr">
+            <a:pPr lvl="0" algn="ctr">
               <a:buNone/>
             </a:pPr>
             <a:r>
@@ -3768,28 +3669,7 @@
                 <a:latin typeface="Microsoft JhengHei" pitchFamily="34" charset="-120"/>
                 <a:ea typeface="Microsoft JhengHei" pitchFamily="34" charset="-120"/>
               </a:rPr>
-              <a:t>耶</a:t>
-            </a:r>
-            <a:r>
-              <a:rPr lang="zh-TW" altLang="en-US" sz="4800" b="1" dirty="0">
-                <a:latin typeface="Microsoft JhengHei" pitchFamily="34" charset="-120"/>
-                <a:ea typeface="Microsoft JhengHei" pitchFamily="34" charset="-120"/>
-              </a:rPr>
-              <a:t>穌  耶穌  何</a:t>
-            </a:r>
-            <a:r>
-              <a:rPr lang="zh-TW" altLang="en-US" sz="4800" b="1" dirty="0">
-                <a:latin typeface="Microsoft JhengHei" pitchFamily="34" charset="-120"/>
-                <a:ea typeface="Microsoft JhengHei" pitchFamily="34" charset="-120"/>
-              </a:rPr>
-              <a:t>等可</a:t>
-            </a:r>
-            <a:r>
-              <a:rPr lang="zh-TW" altLang="en-US" sz="4800" b="1" dirty="0">
-                <a:latin typeface="Microsoft JhengHei" pitchFamily="34" charset="-120"/>
-                <a:ea typeface="Microsoft JhengHei" pitchFamily="34" charset="-120"/>
-              </a:rPr>
-              <a:t>靠</a:t>
+              <a:t>耶穌 耶穌  何等可靠</a:t>
             </a:r>
             <a:endParaRPr lang="en-US" altLang="zh-TW" sz="4800" b="1" dirty="0">
               <a:latin typeface="Microsoft JhengHei" pitchFamily="34" charset="-120"/>
@@ -3797,7 +3677,7 @@
             </a:endParaRPr>
           </a:p>
           <a:p>
-            <a:pPr marL="0" indent="0" algn="ctr">
+            <a:pPr lvl="0" algn="ctr">
               <a:buNone/>
             </a:pPr>
             <a:r>
@@ -3805,21 +3685,21 @@
                 <a:latin typeface="Microsoft JhengHei" pitchFamily="34" charset="-120"/>
                 <a:ea typeface="Microsoft JhengHei" pitchFamily="34" charset="-120"/>
               </a:rPr>
-              <a:t>多</a:t>
+              <a:t>多少</a:t>
             </a:r>
             <a:r>
               <a:rPr lang="zh-TW" altLang="en-US" sz="4800" b="1" dirty="0">
                 <a:latin typeface="Microsoft JhengHei" pitchFamily="34" charset="-120"/>
                 <a:ea typeface="Microsoft JhengHei" pitchFamily="34" charset="-120"/>
               </a:rPr>
-              <a:t>少事上已證</a:t>
+              <a:t>事上已</a:t>
             </a:r>
             <a:r>
               <a:rPr lang="zh-TW" altLang="en-US" sz="4800" b="1" dirty="0">
                 <a:latin typeface="Microsoft JhengHei" pitchFamily="34" charset="-120"/>
                 <a:ea typeface="Microsoft JhengHei" pitchFamily="34" charset="-120"/>
               </a:rPr>
-              <a:t>明</a:t>
+              <a:t>證明</a:t>
             </a:r>
             <a:endParaRPr lang="en-US" altLang="zh-TW" sz="4800" b="1" dirty="0">
               <a:latin typeface="Microsoft JhengHei" pitchFamily="34" charset="-120"/>
@@ -3827,7 +3707,7 @@
             </a:endParaRPr>
           </a:p>
           <a:p>
-            <a:pPr marL="0" indent="0" algn="ctr">
+            <a:pPr lvl="0" algn="ctr">
               <a:buNone/>
             </a:pPr>
             <a:r>
@@ -3835,21 +3715,7 @@
                 <a:latin typeface="Microsoft JhengHei" pitchFamily="34" charset="-120"/>
                 <a:ea typeface="Microsoft JhengHei" pitchFamily="34" charset="-120"/>
               </a:rPr>
-              <a:t>耶穌  耶穌  寶</a:t>
-            </a:r>
-            <a:r>
-              <a:rPr lang="zh-TW" altLang="en-US" sz="4800" b="1" dirty="0">
-                <a:latin typeface="Microsoft JhengHei" pitchFamily="34" charset="-120"/>
-                <a:ea typeface="Microsoft JhengHei" pitchFamily="34" charset="-120"/>
-              </a:rPr>
-              <a:t>貴耶</a:t>
-            </a:r>
-            <a:r>
-              <a:rPr lang="zh-TW" altLang="en-US" sz="4800" b="1" dirty="0">
-                <a:latin typeface="Microsoft JhengHei" pitchFamily="34" charset="-120"/>
-                <a:ea typeface="Microsoft JhengHei" pitchFamily="34" charset="-120"/>
-              </a:rPr>
-              <a:t>穌</a:t>
+              <a:t>耶穌  耶穌  寶貴耶穌</a:t>
             </a:r>
             <a:endParaRPr lang="en-US" altLang="zh-TW" sz="4800" b="1" dirty="0">
               <a:latin typeface="Microsoft JhengHei" pitchFamily="34" charset="-120"/>
@@ -3857,7 +3723,7 @@
             </a:endParaRPr>
           </a:p>
           <a:p>
-            <a:pPr marL="0" indent="0" algn="ctr">
+            <a:pPr lvl="0" algn="ctr">
               <a:buNone/>
             </a:pPr>
             <a:r>
@@ -3874,17 +3740,13 @@
               </a:rPr>
               <a:t>我信心更堅定</a:t>
             </a:r>
-            <a:endParaRPr lang="en-US" sz="4800" b="1" dirty="0">
-              <a:latin typeface="Microsoft JhengHei" pitchFamily="34" charset="-120"/>
-              <a:ea typeface="Microsoft JhengHei" pitchFamily="34" charset="-120"/>
-            </a:endParaRPr>
           </a:p>
         </p:txBody>
       </p:sp>
     </p:spTree>
     <p:extLst>
       <p:ext uri="{BB962C8B-B14F-4D97-AF65-F5344CB8AC3E}">
-        <p14:creationId xmlns:p14="http://schemas.microsoft.com/office/powerpoint/2010/main" val="1627757109"/>
+        <p14:creationId xmlns:p14="http://schemas.microsoft.com/office/powerpoint/2010/main" val="3096445472"/>
       </p:ext>
     </p:extLst>
   </p:cSld>
@@ -3913,7 +3775,7 @@
       </p:grpSpPr>
       <p:sp>
         <p:nvSpPr>
-          <p:cNvPr id="2" name="Title 1"/>
+          <p:cNvPr id="4" name="標題 3"/>
           <p:cNvSpPr>
             <a:spLocks noGrp="1"/>
           </p:cNvSpPr>
@@ -3935,16 +3797,12 @@
               </a:rPr>
               <a:t>信靠耶穌真是甜美</a:t>
             </a:r>
-            <a:endParaRPr lang="en-US" sz="4000" b="1" dirty="0">
-              <a:latin typeface="Microsoft JhengHei" pitchFamily="34" charset="-120"/>
-              <a:ea typeface="Microsoft JhengHei" pitchFamily="34" charset="-120"/>
-            </a:endParaRPr>
-          </a:p>
-        </p:txBody>
-      </p:sp>
-      <p:sp>
-        <p:nvSpPr>
-          <p:cNvPr id="3" name="Content Placeholder 2"/>
+          </a:p>
+        </p:txBody>
+      </p:sp>
+      <p:sp>
+        <p:nvSpPr>
+          <p:cNvPr id="5" name="內容版面配置區 4"/>
           <p:cNvSpPr>
             <a:spLocks noGrp="1"/>
           </p:cNvSpPr>
@@ -3952,19 +3810,14 @@
             <p:ph idx="1"/>
           </p:nvPr>
         </p:nvSpPr>
-        <p:spPr>
-          <a:xfrm>
-            <a:off x="0" y="1200150"/>
-            <a:ext cx="9144000" cy="3943349"/>
-          </a:xfrm>
-        </p:spPr>
+        <p:spPr/>
         <p:txBody>
           <a:bodyPr>
-            <a:normAutofit/>
+            <a:noAutofit/>
           </a:bodyPr>
           <a:lstStyle/>
           <a:p>
-            <a:pPr marL="0" indent="0" algn="ctr">
+            <a:pPr algn="ctr">
               <a:buNone/>
             </a:pPr>
             <a:r>
@@ -3972,14 +3825,28 @@
                 <a:latin typeface="Microsoft JhengHei" pitchFamily="34" charset="-120"/>
                 <a:ea typeface="Microsoft JhengHei" pitchFamily="34" charset="-120"/>
               </a:rPr>
-              <a:t>信靠耶穌確實甜</a:t>
+              <a:t>感謝</a:t>
             </a:r>
             <a:r>
               <a:rPr lang="zh-TW" altLang="en-US" sz="4800" b="1" dirty="0">
                 <a:latin typeface="Microsoft JhengHei" pitchFamily="34" charset="-120"/>
                 <a:ea typeface="Microsoft JhengHei" pitchFamily="34" charset="-120"/>
               </a:rPr>
-              <a:t>美</a:t>
+              <a:t>主助</a:t>
+            </a:r>
+            <a:r>
+              <a:rPr lang="zh-TW" altLang="en-US" sz="4800" b="1" dirty="0">
+                <a:latin typeface="Microsoft JhengHei" pitchFamily="34" charset="-120"/>
+                <a:ea typeface="Microsoft JhengHei" pitchFamily="34" charset="-120"/>
+              </a:rPr>
+              <a:t>我信靠</a:t>
+            </a:r>
+            <a:r>
+              <a:rPr lang="zh-TW" altLang="en-US" sz="4800" b="1" dirty="0">
+                <a:latin typeface="Microsoft JhengHei" pitchFamily="34" charset="-120"/>
+                <a:ea typeface="Microsoft JhengHei" pitchFamily="34" charset="-120"/>
+              </a:rPr>
+              <a:t>你</a:t>
             </a:r>
             <a:endParaRPr lang="en-US" altLang="zh-TW" sz="4800" b="1" dirty="0">
               <a:latin typeface="Microsoft JhengHei" pitchFamily="34" charset="-120"/>
@@ -3987,7 +3854,7 @@
             </a:endParaRPr>
           </a:p>
           <a:p>
-            <a:pPr marL="0" indent="0" algn="ctr">
+            <a:pPr algn="ctr">
               <a:buNone/>
             </a:pPr>
             <a:r>
@@ -3995,21 +3862,44 @@
                 <a:latin typeface="Microsoft JhengHei" pitchFamily="34" charset="-120"/>
                 <a:ea typeface="Microsoft JhengHei" pitchFamily="34" charset="-120"/>
               </a:rPr>
-              <a:t>污</a:t>
+              <a:t>你</a:t>
             </a:r>
             <a:r>
               <a:rPr lang="zh-TW" altLang="en-US" sz="4800" b="1" dirty="0">
                 <a:latin typeface="Microsoft JhengHei" pitchFamily="34" charset="-120"/>
                 <a:ea typeface="Microsoft JhengHei" pitchFamily="34" charset="-120"/>
               </a:rPr>
-              <a:t>穢本性即停</a:t>
+              <a:t>是我救主</a:t>
             </a:r>
             <a:r>
               <a:rPr lang="zh-TW" altLang="en-US" sz="4800" b="1" dirty="0">
                 <a:latin typeface="Microsoft JhengHei" pitchFamily="34" charset="-120"/>
                 <a:ea typeface="Microsoft JhengHei" pitchFamily="34" charset="-120"/>
               </a:rPr>
-              <a:t>止</a:t>
+              <a:t>良友</a:t>
+            </a:r>
+            <a:endParaRPr lang="zh-TW" altLang="en-US" sz="4800" b="1" dirty="0">
+              <a:latin typeface="Microsoft JhengHei" pitchFamily="34" charset="-120"/>
+              <a:ea typeface="Microsoft JhengHei" pitchFamily="34" charset="-120"/>
+            </a:endParaRPr>
+          </a:p>
+          <a:p>
+            <a:pPr algn="ctr">
+              <a:buNone/>
+            </a:pPr>
+            <a:r>
+              <a:rPr lang="zh-TW" altLang="en-US" sz="4800" b="1" dirty="0">
+                <a:latin typeface="Microsoft JhengHei" pitchFamily="34" charset="-120"/>
+                <a:ea typeface="Microsoft JhengHei" pitchFamily="34" charset="-120"/>
+              </a:rPr>
+              <a:t>我深信你與我同</a:t>
+            </a:r>
+            <a:r>
+              <a:rPr lang="zh-TW" altLang="en-US" sz="4800" b="1" dirty="0">
+                <a:latin typeface="Microsoft JhengHei" pitchFamily="34" charset="-120"/>
+                <a:ea typeface="Microsoft JhengHei" pitchFamily="34" charset="-120"/>
+              </a:rPr>
+              <a:t>在</a:t>
             </a:r>
             <a:endParaRPr lang="en-US" altLang="zh-TW" sz="4800" b="1" dirty="0">
               <a:latin typeface="Microsoft JhengHei" pitchFamily="34" charset="-120"/>
@@ -4017,7 +3907,7 @@
             </a:endParaRPr>
           </a:p>
           <a:p>
-            <a:pPr marL="0" indent="0" algn="ctr">
+            <a:pPr algn="ctr">
               <a:buNone/>
             </a:pPr>
             <a:r>
@@ -4025,69 +3915,28 @@
                 <a:latin typeface="Microsoft JhengHei" pitchFamily="34" charset="-120"/>
                 <a:ea typeface="Microsoft JhengHei" pitchFamily="34" charset="-120"/>
               </a:rPr>
-              <a:t>得</a:t>
+              <a:t>從</a:t>
             </a:r>
             <a:r>
               <a:rPr lang="zh-TW" altLang="en-US" sz="4800" b="1" dirty="0">
                 <a:latin typeface="Microsoft JhengHei" pitchFamily="34" charset="-120"/>
                 <a:ea typeface="Microsoft JhengHei" pitchFamily="34" charset="-120"/>
               </a:rPr>
-              <a:t>著耶穌得著一</a:t>
-            </a:r>
-            <a:r>
-              <a:rPr lang="zh-TW" altLang="en-US" sz="4800" b="1" dirty="0">
-                <a:latin typeface="Microsoft JhengHei" pitchFamily="34" charset="-120"/>
-                <a:ea typeface="Microsoft JhengHei" pitchFamily="34" charset="-120"/>
-              </a:rPr>
-              <a:t>切</a:t>
-            </a:r>
-            <a:endParaRPr lang="en-US" altLang="zh-TW" sz="4800" b="1" dirty="0">
-              <a:latin typeface="Microsoft JhengHei" pitchFamily="34" charset="-120"/>
-              <a:ea typeface="Microsoft JhengHei" pitchFamily="34" charset="-120"/>
-            </a:endParaRPr>
-          </a:p>
-          <a:p>
-            <a:pPr marL="0" indent="0" algn="ctr">
-              <a:buNone/>
-            </a:pPr>
-            <a:r>
-              <a:rPr lang="zh-TW" altLang="en-US" sz="4800" b="1" dirty="0">
-                <a:latin typeface="Microsoft JhengHei" pitchFamily="34" charset="-120"/>
-                <a:ea typeface="Microsoft JhengHei" pitchFamily="34" charset="-120"/>
-              </a:rPr>
-              <a:t>生</a:t>
-            </a:r>
-            <a:r>
-              <a:rPr lang="zh-TW" altLang="en-US" sz="4800" b="1" dirty="0">
-                <a:latin typeface="Microsoft JhengHei" pitchFamily="34" charset="-120"/>
-                <a:ea typeface="Microsoft JhengHei" pitchFamily="34" charset="-120"/>
-              </a:rPr>
-              <a:t>命喜樂和安</a:t>
-            </a:r>
-            <a:r>
-              <a:rPr lang="zh-TW" altLang="en-US" sz="4800" b="1" dirty="0">
-                <a:latin typeface="Microsoft JhengHei" pitchFamily="34" charset="-120"/>
-                <a:ea typeface="Microsoft JhengHei" pitchFamily="34" charset="-120"/>
-              </a:rPr>
-              <a:t>息</a:t>
-            </a:r>
-            <a:endParaRPr lang="en-US" sz="4800" b="1" dirty="0">
-              <a:latin typeface="Microsoft JhengHei" pitchFamily="34" charset="-120"/>
-              <a:ea typeface="Microsoft JhengHei" pitchFamily="34" charset="-120"/>
-            </a:endParaRPr>
-          </a:p>
-        </p:txBody>
-      </p:sp>
-      <p:sp>
-        <p:nvSpPr>
-          <p:cNvPr id="4" name="TextBox 3"/>
+              <a:t>今時直到永久</a:t>
+            </a:r>
+          </a:p>
+        </p:txBody>
+      </p:sp>
+      <p:sp>
+        <p:nvSpPr>
+          <p:cNvPr id="6" name="TextBox 5"/>
           <p:cNvSpPr txBox="1"/>
           <p:nvPr/>
         </p:nvSpPr>
         <p:spPr>
           <a:xfrm>
-            <a:off x="1371600" y="1276350"/>
-            <a:ext cx="762000" cy="707886"/>
+            <a:off x="1219200" y="1276350"/>
+            <a:ext cx="914400" cy="769441"/>
           </a:xfrm>
           <a:prstGeom prst="rect">
             <a:avLst/>
@@ -4101,20 +3950,13 @@
           <a:lstStyle/>
           <a:p>
             <a:r>
-              <a:rPr lang="en-US" sz="4000" b="1" dirty="0">
-                <a:latin typeface="Microsoft JhengHei" pitchFamily="34" charset="-120"/>
-                <a:ea typeface="Microsoft JhengHei" pitchFamily="34" charset="-120"/>
-              </a:rPr>
-              <a:t>3</a:t>
-            </a:r>
-            <a:r>
-              <a:rPr lang="en-US" sz="4000" b="1" dirty="0" smtClean="0">
-                <a:latin typeface="Microsoft JhengHei" pitchFamily="34" charset="-120"/>
-                <a:ea typeface="Microsoft JhengHei" pitchFamily="34" charset="-120"/>
-              </a:rPr>
-              <a:t>.</a:t>
-            </a:r>
-            <a:endParaRPr lang="en-US" sz="4000" b="1" dirty="0">
+              <a:rPr lang="en-US" sz="4400" b="1" dirty="0" smtClean="0">
+                <a:latin typeface="Microsoft JhengHei" pitchFamily="34" charset="-120"/>
+                <a:ea typeface="Microsoft JhengHei" pitchFamily="34" charset="-120"/>
+              </a:rPr>
+              <a:t>3.</a:t>
+            </a:r>
+            <a:endParaRPr lang="en-US" sz="4400" b="1" dirty="0">
               <a:latin typeface="Microsoft JhengHei" pitchFamily="34" charset="-120"/>
               <a:ea typeface="Microsoft JhengHei" pitchFamily="34" charset="-120"/>
             </a:endParaRPr>
@@ -4124,7 +3966,7 @@
     </p:spTree>
     <p:extLst>
       <p:ext uri="{BB962C8B-B14F-4D97-AF65-F5344CB8AC3E}">
-        <p14:creationId xmlns:p14="http://schemas.microsoft.com/office/powerpoint/2010/main" val="2963544086"/>
+        <p14:creationId xmlns:p14="http://schemas.microsoft.com/office/powerpoint/2010/main" val="363747435"/>
       </p:ext>
     </p:extLst>
   </p:cSld>
@@ -4153,7 +3995,7 @@
       </p:grpSpPr>
       <p:sp>
         <p:nvSpPr>
-          <p:cNvPr id="2" name="Title 1"/>
+          <p:cNvPr id="4" name="標題 3"/>
           <p:cNvSpPr>
             <a:spLocks noGrp="1"/>
           </p:cNvSpPr>
@@ -4175,16 +4017,12 @@
               </a:rPr>
               <a:t>信靠耶穌真是甜美</a:t>
             </a:r>
-            <a:endParaRPr lang="en-US" sz="4000" b="1" dirty="0">
-              <a:latin typeface="Microsoft JhengHei" pitchFamily="34" charset="-120"/>
-              <a:ea typeface="Microsoft JhengHei" pitchFamily="34" charset="-120"/>
-            </a:endParaRPr>
-          </a:p>
-        </p:txBody>
-      </p:sp>
-      <p:sp>
-        <p:nvSpPr>
-          <p:cNvPr id="3" name="Content Placeholder 2"/>
+          </a:p>
+        </p:txBody>
+      </p:sp>
+      <p:sp>
+        <p:nvSpPr>
+          <p:cNvPr id="5" name="內容版面配置區 4"/>
           <p:cNvSpPr>
             <a:spLocks noGrp="1"/>
           </p:cNvSpPr>
@@ -4192,19 +4030,14 @@
             <p:ph idx="1"/>
           </p:nvPr>
         </p:nvSpPr>
-        <p:spPr>
-          <a:xfrm>
-            <a:off x="0" y="1200150"/>
-            <a:ext cx="9144000" cy="3943349"/>
-          </a:xfrm>
-        </p:spPr>
+        <p:spPr/>
         <p:txBody>
           <a:bodyPr>
-            <a:normAutofit/>
+            <a:noAutofit/>
           </a:bodyPr>
           <a:lstStyle/>
           <a:p>
-            <a:pPr marL="0" indent="0" algn="ctr">
+            <a:pPr lvl="0" algn="ctr">
               <a:buNone/>
             </a:pPr>
             <a:r>
@@ -4212,28 +4045,7 @@
                 <a:latin typeface="Microsoft JhengHei" pitchFamily="34" charset="-120"/>
                 <a:ea typeface="Microsoft JhengHei" pitchFamily="34" charset="-120"/>
               </a:rPr>
-              <a:t>耶</a:t>
-            </a:r>
-            <a:r>
-              <a:rPr lang="zh-TW" altLang="en-US" sz="4800" b="1" dirty="0">
-                <a:latin typeface="Microsoft JhengHei" pitchFamily="34" charset="-120"/>
-                <a:ea typeface="Microsoft JhengHei" pitchFamily="34" charset="-120"/>
-              </a:rPr>
-              <a:t>穌  耶穌  何</a:t>
-            </a:r>
-            <a:r>
-              <a:rPr lang="zh-TW" altLang="en-US" sz="4800" b="1" dirty="0">
-                <a:latin typeface="Microsoft JhengHei" pitchFamily="34" charset="-120"/>
-                <a:ea typeface="Microsoft JhengHei" pitchFamily="34" charset="-120"/>
-              </a:rPr>
-              <a:t>等可</a:t>
-            </a:r>
-            <a:r>
-              <a:rPr lang="zh-TW" altLang="en-US" sz="4800" b="1" dirty="0">
-                <a:latin typeface="Microsoft JhengHei" pitchFamily="34" charset="-120"/>
-                <a:ea typeface="Microsoft JhengHei" pitchFamily="34" charset="-120"/>
-              </a:rPr>
-              <a:t>靠</a:t>
+              <a:t>耶穌 耶穌  何等可靠</a:t>
             </a:r>
             <a:endParaRPr lang="en-US" altLang="zh-TW" sz="4800" b="1" dirty="0">
               <a:latin typeface="Microsoft JhengHei" pitchFamily="34" charset="-120"/>
@@ -4241,7 +4053,7 @@
             </a:endParaRPr>
           </a:p>
           <a:p>
-            <a:pPr marL="0" indent="0" algn="ctr">
+            <a:pPr lvl="0" algn="ctr">
               <a:buNone/>
             </a:pPr>
             <a:r>
@@ -4249,21 +4061,21 @@
                 <a:latin typeface="Microsoft JhengHei" pitchFamily="34" charset="-120"/>
                 <a:ea typeface="Microsoft JhengHei" pitchFamily="34" charset="-120"/>
               </a:rPr>
-              <a:t>多</a:t>
+              <a:t>多少</a:t>
             </a:r>
             <a:r>
               <a:rPr lang="zh-TW" altLang="en-US" sz="4800" b="1" dirty="0">
                 <a:latin typeface="Microsoft JhengHei" pitchFamily="34" charset="-120"/>
                 <a:ea typeface="Microsoft JhengHei" pitchFamily="34" charset="-120"/>
               </a:rPr>
-              <a:t>少事上已證</a:t>
+              <a:t>事上已</a:t>
             </a:r>
             <a:r>
               <a:rPr lang="zh-TW" altLang="en-US" sz="4800" b="1" dirty="0">
                 <a:latin typeface="Microsoft JhengHei" pitchFamily="34" charset="-120"/>
                 <a:ea typeface="Microsoft JhengHei" pitchFamily="34" charset="-120"/>
               </a:rPr>
-              <a:t>明</a:t>
+              <a:t>證明</a:t>
             </a:r>
             <a:endParaRPr lang="en-US" altLang="zh-TW" sz="4800" b="1" dirty="0">
               <a:latin typeface="Microsoft JhengHei" pitchFamily="34" charset="-120"/>
@@ -4271,7 +4083,7 @@
             </a:endParaRPr>
           </a:p>
           <a:p>
-            <a:pPr marL="0" indent="0" algn="ctr">
+            <a:pPr lvl="0" algn="ctr">
               <a:buNone/>
             </a:pPr>
             <a:r>
@@ -4279,21 +4091,7 @@
                 <a:latin typeface="Microsoft JhengHei" pitchFamily="34" charset="-120"/>
                 <a:ea typeface="Microsoft JhengHei" pitchFamily="34" charset="-120"/>
               </a:rPr>
-              <a:t>耶穌  耶穌  寶</a:t>
-            </a:r>
-            <a:r>
-              <a:rPr lang="zh-TW" altLang="en-US" sz="4800" b="1" dirty="0">
-                <a:latin typeface="Microsoft JhengHei" pitchFamily="34" charset="-120"/>
-                <a:ea typeface="Microsoft JhengHei" pitchFamily="34" charset="-120"/>
-              </a:rPr>
-              <a:t>貴耶</a:t>
-            </a:r>
-            <a:r>
-              <a:rPr lang="zh-TW" altLang="en-US" sz="4800" b="1" dirty="0">
-                <a:latin typeface="Microsoft JhengHei" pitchFamily="34" charset="-120"/>
-                <a:ea typeface="Microsoft JhengHei" pitchFamily="34" charset="-120"/>
-              </a:rPr>
-              <a:t>穌</a:t>
+              <a:t>耶穌  耶穌  寶貴耶穌</a:t>
             </a:r>
             <a:endParaRPr lang="en-US" altLang="zh-TW" sz="4800" b="1" dirty="0">
               <a:latin typeface="Microsoft JhengHei" pitchFamily="34" charset="-120"/>
@@ -4301,7 +4099,7 @@
             </a:endParaRPr>
           </a:p>
           <a:p>
-            <a:pPr marL="0" indent="0" algn="ctr">
+            <a:pPr lvl="0" algn="ctr">
               <a:buNone/>
             </a:pPr>
             <a:r>
@@ -4318,461 +4116,13 @@
               </a:rPr>
               <a:t>我信心更堅定</a:t>
             </a:r>
-            <a:endParaRPr lang="en-US" sz="4800" b="1" dirty="0">
-              <a:latin typeface="Microsoft JhengHei" pitchFamily="34" charset="-120"/>
-              <a:ea typeface="Microsoft JhengHei" pitchFamily="34" charset="-120"/>
-            </a:endParaRPr>
           </a:p>
         </p:txBody>
       </p:sp>
     </p:spTree>
     <p:extLst>
       <p:ext uri="{BB962C8B-B14F-4D97-AF65-F5344CB8AC3E}">
-        <p14:creationId xmlns:p14="http://schemas.microsoft.com/office/powerpoint/2010/main" val="987683549"/>
-      </p:ext>
-    </p:extLst>
-  </p:cSld>
-  <p:clrMapOvr>
-    <a:masterClrMapping/>
-  </p:clrMapOvr>
-</p:sld>
-</file>
-
-<file path=ppt/slides/slide7.xml><?xml version="1.0" encoding="utf-8"?>
-<p:sld xmlns:a="http://schemas.openxmlformats.org/drawingml/2006/main" xmlns:r="http://schemas.openxmlformats.org/officeDocument/2006/relationships" xmlns:p="http://schemas.openxmlformats.org/presentationml/2006/main">
-  <p:cSld>
-    <p:spTree>
-      <p:nvGrpSpPr>
-        <p:cNvPr id="1" name=""/>
-        <p:cNvGrpSpPr/>
-        <p:nvPr/>
-      </p:nvGrpSpPr>
-      <p:grpSpPr>
-        <a:xfrm>
-          <a:off x="0" y="0"/>
-          <a:ext cx="0" cy="0"/>
-          <a:chOff x="0" y="0"/>
-          <a:chExt cx="0" cy="0"/>
-        </a:xfrm>
-      </p:grpSpPr>
-      <p:sp>
-        <p:nvSpPr>
-          <p:cNvPr id="2" name="Title 1"/>
-          <p:cNvSpPr>
-            <a:spLocks noGrp="1"/>
-          </p:cNvSpPr>
-          <p:nvPr>
-            <p:ph type="title"/>
-          </p:nvPr>
-        </p:nvSpPr>
-        <p:spPr/>
-        <p:txBody>
-          <a:bodyPr>
-            <a:normAutofit/>
-          </a:bodyPr>
-          <a:lstStyle/>
-          <a:p>
-            <a:r>
-              <a:rPr lang="zh-TW" altLang="en-US" sz="4000" b="1" dirty="0">
-                <a:latin typeface="Microsoft JhengHei" pitchFamily="34" charset="-120"/>
-                <a:ea typeface="Microsoft JhengHei" pitchFamily="34" charset="-120"/>
-              </a:rPr>
-              <a:t>信靠耶穌真是甜美</a:t>
-            </a:r>
-            <a:endParaRPr lang="en-US" sz="4000" b="1" dirty="0">
-              <a:latin typeface="Microsoft JhengHei" pitchFamily="34" charset="-120"/>
-              <a:ea typeface="Microsoft JhengHei" pitchFamily="34" charset="-120"/>
-            </a:endParaRPr>
-          </a:p>
-        </p:txBody>
-      </p:sp>
-      <p:sp>
-        <p:nvSpPr>
-          <p:cNvPr id="3" name="Content Placeholder 2"/>
-          <p:cNvSpPr>
-            <a:spLocks noGrp="1"/>
-          </p:cNvSpPr>
-          <p:nvPr>
-            <p:ph idx="1"/>
-          </p:nvPr>
-        </p:nvSpPr>
-        <p:spPr>
-          <a:xfrm>
-            <a:off x="0" y="1200150"/>
-            <a:ext cx="9144000" cy="3943349"/>
-          </a:xfrm>
-        </p:spPr>
-        <p:txBody>
-          <a:bodyPr>
-            <a:normAutofit/>
-          </a:bodyPr>
-          <a:lstStyle/>
-          <a:p>
-            <a:pPr marL="0" indent="0" algn="ctr">
-              <a:buNone/>
-            </a:pPr>
-            <a:r>
-              <a:rPr lang="zh-TW" altLang="en-US" sz="4800" b="1" dirty="0">
-                <a:latin typeface="Microsoft JhengHei" pitchFamily="34" charset="-120"/>
-                <a:ea typeface="Microsoft JhengHei" pitchFamily="34" charset="-120"/>
-              </a:rPr>
-              <a:t>我真快</a:t>
-            </a:r>
-            <a:r>
-              <a:rPr lang="zh-TW" altLang="en-US" sz="4800" b="1" dirty="0">
-                <a:latin typeface="Microsoft JhengHei" pitchFamily="34" charset="-120"/>
-                <a:ea typeface="Microsoft JhengHei" pitchFamily="34" charset="-120"/>
-              </a:rPr>
-              <a:t>樂  我</a:t>
-            </a:r>
-            <a:r>
-              <a:rPr lang="zh-TW" altLang="en-US" sz="4800" b="1" dirty="0">
-                <a:latin typeface="Microsoft JhengHei" pitchFamily="34" charset="-120"/>
-                <a:ea typeface="Microsoft JhengHei" pitchFamily="34" charset="-120"/>
-              </a:rPr>
-              <a:t>信靠</a:t>
-            </a:r>
-            <a:r>
-              <a:rPr lang="zh-TW" altLang="en-US" sz="4800" b="1" dirty="0">
-                <a:latin typeface="Microsoft JhengHei" pitchFamily="34" charset="-120"/>
-                <a:ea typeface="Microsoft JhengHei" pitchFamily="34" charset="-120"/>
-              </a:rPr>
-              <a:t>你</a:t>
-            </a:r>
-            <a:endParaRPr lang="en-US" altLang="zh-TW" sz="4800" b="1" dirty="0">
-              <a:latin typeface="Microsoft JhengHei" pitchFamily="34" charset="-120"/>
-              <a:ea typeface="Microsoft JhengHei" pitchFamily="34" charset="-120"/>
-            </a:endParaRPr>
-          </a:p>
-          <a:p>
-            <a:pPr marL="0" indent="0" algn="ctr">
-              <a:buNone/>
-            </a:pPr>
-            <a:r>
-              <a:rPr lang="zh-TW" altLang="en-US" sz="4800" b="1" dirty="0">
-                <a:latin typeface="Microsoft JhengHei" pitchFamily="34" charset="-120"/>
-                <a:ea typeface="Microsoft JhengHei" pitchFamily="34" charset="-120"/>
-              </a:rPr>
-              <a:t>你</a:t>
-            </a:r>
-            <a:r>
-              <a:rPr lang="zh-TW" altLang="en-US" sz="4800" b="1" dirty="0">
-                <a:latin typeface="Microsoft JhengHei" pitchFamily="34" charset="-120"/>
-                <a:ea typeface="Microsoft JhengHei" pitchFamily="34" charset="-120"/>
-              </a:rPr>
-              <a:t>是我救主良</a:t>
-            </a:r>
-            <a:r>
-              <a:rPr lang="zh-TW" altLang="en-US" sz="4800" b="1" dirty="0">
-                <a:latin typeface="Microsoft JhengHei" pitchFamily="34" charset="-120"/>
-                <a:ea typeface="Microsoft JhengHei" pitchFamily="34" charset="-120"/>
-              </a:rPr>
-              <a:t>友</a:t>
-            </a:r>
-            <a:endParaRPr lang="en-US" altLang="zh-TW" sz="4800" b="1" dirty="0">
-              <a:latin typeface="Microsoft JhengHei" pitchFamily="34" charset="-120"/>
-              <a:ea typeface="Microsoft JhengHei" pitchFamily="34" charset="-120"/>
-            </a:endParaRPr>
-          </a:p>
-          <a:p>
-            <a:pPr marL="0" indent="0" algn="ctr">
-              <a:buNone/>
-            </a:pPr>
-            <a:r>
-              <a:rPr lang="zh-TW" altLang="en-US" sz="4800" b="1" dirty="0">
-                <a:latin typeface="Microsoft JhengHei" pitchFamily="34" charset="-120"/>
-                <a:ea typeface="Microsoft JhengHei" pitchFamily="34" charset="-120"/>
-              </a:rPr>
-              <a:t>我</a:t>
-            </a:r>
-            <a:r>
-              <a:rPr lang="zh-TW" altLang="en-US" sz="4800" b="1" dirty="0">
-                <a:latin typeface="Microsoft JhengHei" pitchFamily="34" charset="-120"/>
-                <a:ea typeface="Microsoft JhengHei" pitchFamily="34" charset="-120"/>
-              </a:rPr>
-              <a:t>深信你與我同</a:t>
-            </a:r>
-            <a:r>
-              <a:rPr lang="zh-TW" altLang="en-US" sz="4800" b="1" dirty="0">
-                <a:latin typeface="Microsoft JhengHei" pitchFamily="34" charset="-120"/>
-                <a:ea typeface="Microsoft JhengHei" pitchFamily="34" charset="-120"/>
-              </a:rPr>
-              <a:t>在</a:t>
-            </a:r>
-            <a:endParaRPr lang="en-US" altLang="zh-TW" sz="4800" b="1" dirty="0">
-              <a:latin typeface="Microsoft JhengHei" pitchFamily="34" charset="-120"/>
-              <a:ea typeface="Microsoft JhengHei" pitchFamily="34" charset="-120"/>
-            </a:endParaRPr>
-          </a:p>
-          <a:p>
-            <a:pPr marL="0" indent="0" algn="ctr">
-              <a:buNone/>
-            </a:pPr>
-            <a:r>
-              <a:rPr lang="zh-TW" altLang="en-US" sz="4800" b="1" dirty="0">
-                <a:latin typeface="Microsoft JhengHei" pitchFamily="34" charset="-120"/>
-                <a:ea typeface="Microsoft JhengHei" pitchFamily="34" charset="-120"/>
-              </a:rPr>
-              <a:t>從</a:t>
-            </a:r>
-            <a:r>
-              <a:rPr lang="zh-TW" altLang="en-US" sz="4800" b="1" dirty="0">
-                <a:latin typeface="Microsoft JhengHei" pitchFamily="34" charset="-120"/>
-                <a:ea typeface="Microsoft JhengHei" pitchFamily="34" charset="-120"/>
-              </a:rPr>
-              <a:t>今時直到永久</a:t>
-            </a:r>
-            <a:endParaRPr lang="en-US" sz="4800" b="1" dirty="0">
-              <a:latin typeface="Microsoft JhengHei" pitchFamily="34" charset="-120"/>
-              <a:ea typeface="Microsoft JhengHei" pitchFamily="34" charset="-120"/>
-            </a:endParaRPr>
-          </a:p>
-        </p:txBody>
-      </p:sp>
-      <p:sp>
-        <p:nvSpPr>
-          <p:cNvPr id="4" name="TextBox 3"/>
-          <p:cNvSpPr txBox="1"/>
-          <p:nvPr/>
-        </p:nvSpPr>
-        <p:spPr>
-          <a:xfrm>
-            <a:off x="1192060" y="1276350"/>
-            <a:ext cx="762000" cy="707886"/>
-          </a:xfrm>
-          <a:prstGeom prst="rect">
-            <a:avLst/>
-          </a:prstGeom>
-          <a:noFill/>
-        </p:spPr>
-        <p:txBody>
-          <a:bodyPr wrap="square" rtlCol="0">
-            <a:spAutoFit/>
-          </a:bodyPr>
-          <a:lstStyle/>
-          <a:p>
-            <a:r>
-              <a:rPr lang="en-US" sz="4000" b="1" dirty="0" smtClean="0">
-                <a:latin typeface="Microsoft JhengHei" pitchFamily="34" charset="-120"/>
-                <a:ea typeface="Microsoft JhengHei" pitchFamily="34" charset="-120"/>
-              </a:rPr>
-              <a:t>4.</a:t>
-            </a:r>
-            <a:endParaRPr lang="en-US" sz="4000" b="1" dirty="0">
-              <a:latin typeface="Microsoft JhengHei" pitchFamily="34" charset="-120"/>
-              <a:ea typeface="Microsoft JhengHei" pitchFamily="34" charset="-120"/>
-            </a:endParaRPr>
-          </a:p>
-        </p:txBody>
-      </p:sp>
-    </p:spTree>
-    <p:extLst>
-      <p:ext uri="{BB962C8B-B14F-4D97-AF65-F5344CB8AC3E}">
-        <p14:creationId xmlns:p14="http://schemas.microsoft.com/office/powerpoint/2010/main" val="3075323758"/>
-      </p:ext>
-    </p:extLst>
-  </p:cSld>
-  <p:clrMapOvr>
-    <a:masterClrMapping/>
-  </p:clrMapOvr>
-</p:sld>
-</file>
-
-<file path=ppt/slides/slide8.xml><?xml version="1.0" encoding="utf-8"?>
-<p:sld xmlns:a="http://schemas.openxmlformats.org/drawingml/2006/main" xmlns:r="http://schemas.openxmlformats.org/officeDocument/2006/relationships" xmlns:p="http://schemas.openxmlformats.org/presentationml/2006/main">
-  <p:cSld>
-    <p:spTree>
-      <p:nvGrpSpPr>
-        <p:cNvPr id="1" name=""/>
-        <p:cNvGrpSpPr/>
-        <p:nvPr/>
-      </p:nvGrpSpPr>
-      <p:grpSpPr>
-        <a:xfrm>
-          <a:off x="0" y="0"/>
-          <a:ext cx="0" cy="0"/>
-          <a:chOff x="0" y="0"/>
-          <a:chExt cx="0" cy="0"/>
-        </a:xfrm>
-      </p:grpSpPr>
-      <p:sp>
-        <p:nvSpPr>
-          <p:cNvPr id="2" name="Title 1"/>
-          <p:cNvSpPr>
-            <a:spLocks noGrp="1"/>
-          </p:cNvSpPr>
-          <p:nvPr>
-            <p:ph type="title"/>
-          </p:nvPr>
-        </p:nvSpPr>
-        <p:spPr/>
-        <p:txBody>
-          <a:bodyPr>
-            <a:normAutofit/>
-          </a:bodyPr>
-          <a:lstStyle/>
-          <a:p>
-            <a:r>
-              <a:rPr lang="zh-TW" altLang="en-US" sz="4000" b="1" dirty="0">
-                <a:latin typeface="Microsoft JhengHei" pitchFamily="34" charset="-120"/>
-                <a:ea typeface="Microsoft JhengHei" pitchFamily="34" charset="-120"/>
-              </a:rPr>
-              <a:t>信靠耶穌真是甜美</a:t>
-            </a:r>
-            <a:endParaRPr lang="en-US" sz="4000" b="1" dirty="0">
-              <a:latin typeface="Microsoft JhengHei" pitchFamily="34" charset="-120"/>
-              <a:ea typeface="Microsoft JhengHei" pitchFamily="34" charset="-120"/>
-            </a:endParaRPr>
-          </a:p>
-        </p:txBody>
-      </p:sp>
-      <p:sp>
-        <p:nvSpPr>
-          <p:cNvPr id="3" name="Content Placeholder 2"/>
-          <p:cNvSpPr>
-            <a:spLocks noGrp="1"/>
-          </p:cNvSpPr>
-          <p:nvPr>
-            <p:ph idx="1"/>
-          </p:nvPr>
-        </p:nvSpPr>
-        <p:spPr>
-          <a:xfrm>
-            <a:off x="0" y="1200150"/>
-            <a:ext cx="9144000" cy="3943349"/>
-          </a:xfrm>
-        </p:spPr>
-        <p:txBody>
-          <a:bodyPr>
-            <a:normAutofit/>
-          </a:bodyPr>
-          <a:lstStyle/>
-          <a:p>
-            <a:pPr marL="0" indent="0" algn="ctr">
-              <a:buNone/>
-            </a:pPr>
-            <a:r>
-              <a:rPr lang="zh-TW" altLang="en-US" sz="4800" b="1" dirty="0">
-                <a:latin typeface="Microsoft JhengHei" pitchFamily="34" charset="-120"/>
-                <a:ea typeface="Microsoft JhengHei" pitchFamily="34" charset="-120"/>
-              </a:rPr>
-              <a:t>耶</a:t>
-            </a:r>
-            <a:r>
-              <a:rPr lang="zh-TW" altLang="en-US" sz="4800" b="1" dirty="0">
-                <a:latin typeface="Microsoft JhengHei" pitchFamily="34" charset="-120"/>
-                <a:ea typeface="Microsoft JhengHei" pitchFamily="34" charset="-120"/>
-              </a:rPr>
-              <a:t>穌  耶穌  何</a:t>
-            </a:r>
-            <a:r>
-              <a:rPr lang="zh-TW" altLang="en-US" sz="4800" b="1" dirty="0">
-                <a:latin typeface="Microsoft JhengHei" pitchFamily="34" charset="-120"/>
-                <a:ea typeface="Microsoft JhengHei" pitchFamily="34" charset="-120"/>
-              </a:rPr>
-              <a:t>等可</a:t>
-            </a:r>
-            <a:r>
-              <a:rPr lang="zh-TW" altLang="en-US" sz="4800" b="1" dirty="0">
-                <a:latin typeface="Microsoft JhengHei" pitchFamily="34" charset="-120"/>
-                <a:ea typeface="Microsoft JhengHei" pitchFamily="34" charset="-120"/>
-              </a:rPr>
-              <a:t>靠</a:t>
-            </a:r>
-            <a:endParaRPr lang="en-US" altLang="zh-TW" sz="4800" b="1" dirty="0">
-              <a:latin typeface="Microsoft JhengHei" pitchFamily="34" charset="-120"/>
-              <a:ea typeface="Microsoft JhengHei" pitchFamily="34" charset="-120"/>
-            </a:endParaRPr>
-          </a:p>
-          <a:p>
-            <a:pPr marL="0" indent="0" algn="ctr">
-              <a:buNone/>
-            </a:pPr>
-            <a:r>
-              <a:rPr lang="zh-TW" altLang="en-US" sz="4800" b="1" dirty="0">
-                <a:latin typeface="Microsoft JhengHei" pitchFamily="34" charset="-120"/>
-                <a:ea typeface="Microsoft JhengHei" pitchFamily="34" charset="-120"/>
-              </a:rPr>
-              <a:t>多</a:t>
-            </a:r>
-            <a:r>
-              <a:rPr lang="zh-TW" altLang="en-US" sz="4800" b="1" dirty="0">
-                <a:latin typeface="Microsoft JhengHei" pitchFamily="34" charset="-120"/>
-                <a:ea typeface="Microsoft JhengHei" pitchFamily="34" charset="-120"/>
-              </a:rPr>
-              <a:t>少事上已證</a:t>
-            </a:r>
-            <a:r>
-              <a:rPr lang="zh-TW" altLang="en-US" sz="4800" b="1" dirty="0">
-                <a:latin typeface="Microsoft JhengHei" pitchFamily="34" charset="-120"/>
-                <a:ea typeface="Microsoft JhengHei" pitchFamily="34" charset="-120"/>
-              </a:rPr>
-              <a:t>明</a:t>
-            </a:r>
-            <a:endParaRPr lang="en-US" altLang="zh-TW" sz="4800" b="1" dirty="0">
-              <a:latin typeface="Microsoft JhengHei" pitchFamily="34" charset="-120"/>
-              <a:ea typeface="Microsoft JhengHei" pitchFamily="34" charset="-120"/>
-            </a:endParaRPr>
-          </a:p>
-          <a:p>
-            <a:pPr marL="0" indent="0" algn="ctr">
-              <a:buNone/>
-            </a:pPr>
-            <a:r>
-              <a:rPr lang="zh-TW" altLang="en-US" sz="4800" b="1" dirty="0">
-                <a:latin typeface="Microsoft JhengHei" pitchFamily="34" charset="-120"/>
-                <a:ea typeface="Microsoft JhengHei" pitchFamily="34" charset="-120"/>
-              </a:rPr>
-              <a:t>耶穌  耶穌  寶</a:t>
-            </a:r>
-            <a:r>
-              <a:rPr lang="zh-TW" altLang="en-US" sz="4800" b="1" dirty="0">
-                <a:latin typeface="Microsoft JhengHei" pitchFamily="34" charset="-120"/>
-                <a:ea typeface="Microsoft JhengHei" pitchFamily="34" charset="-120"/>
-              </a:rPr>
-              <a:t>貴耶</a:t>
-            </a:r>
-            <a:r>
-              <a:rPr lang="zh-TW" altLang="en-US" sz="4800" b="1" dirty="0">
-                <a:latin typeface="Microsoft JhengHei" pitchFamily="34" charset="-120"/>
-                <a:ea typeface="Microsoft JhengHei" pitchFamily="34" charset="-120"/>
-              </a:rPr>
-              <a:t>穌</a:t>
-            </a:r>
-            <a:endParaRPr lang="en-US" altLang="zh-TW" sz="4800" b="1" dirty="0">
-              <a:latin typeface="Microsoft JhengHei" pitchFamily="34" charset="-120"/>
-              <a:ea typeface="Microsoft JhengHei" pitchFamily="34" charset="-120"/>
-            </a:endParaRPr>
-          </a:p>
-          <a:p>
-            <a:pPr marL="0" indent="0" algn="ctr">
-              <a:buNone/>
-            </a:pPr>
-            <a:r>
-              <a:rPr lang="zh-TW" altLang="en-US" sz="4800" b="1" dirty="0">
-                <a:latin typeface="Microsoft JhengHei" pitchFamily="34" charset="-120"/>
-                <a:ea typeface="Microsoft JhengHei" pitchFamily="34" charset="-120"/>
-              </a:rPr>
-              <a:t>願</a:t>
-            </a:r>
-            <a:r>
-              <a:rPr lang="zh-TW" altLang="en-US" sz="4800" b="1" dirty="0">
-                <a:latin typeface="Microsoft JhengHei" pitchFamily="34" charset="-120"/>
-                <a:ea typeface="Microsoft JhengHei" pitchFamily="34" charset="-120"/>
-              </a:rPr>
-              <a:t>我信心更堅定</a:t>
-            </a:r>
-            <a:endParaRPr lang="en-US" sz="4800" b="1" dirty="0">
-              <a:latin typeface="Microsoft JhengHei" pitchFamily="34" charset="-120"/>
-              <a:ea typeface="Microsoft JhengHei" pitchFamily="34" charset="-120"/>
-            </a:endParaRPr>
-          </a:p>
-        </p:txBody>
-      </p:sp>
-    </p:spTree>
-    <p:extLst>
-      <p:ext uri="{BB962C8B-B14F-4D97-AF65-F5344CB8AC3E}">
-        <p14:creationId xmlns:p14="http://schemas.microsoft.com/office/powerpoint/2010/main" val="4276458049"/>
+        <p14:creationId xmlns:p14="http://schemas.microsoft.com/office/powerpoint/2010/main" val="4007816255"/>
       </p:ext>
     </p:extLst>
   </p:cSld>

</xml_diff>